<commit_message>
LSC Presentation 3 final
</commit_message>
<xml_diff>
--- a/2023-11-LSC-3-Modality/LSC - 3 - Modality.pptx
+++ b/2023-11-LSC-3-Modality/LSC - 3 - Modality.pptx
@@ -268,16 +268,95 @@
 </p188:authorLst>
 </file>
 
-<file path=ppt/revisionInfo.xml><?xml version="1.0" encoding="utf-8"?>
-<p1510:revInfo xmlns:a="http://schemas.openxmlformats.org/drawingml/2006/main" xmlns:r="http://schemas.openxmlformats.org/officeDocument/2006/relationships" xmlns:p1510="http://schemas.microsoft.com/office/powerpoint/2015/10/main">
-  <p1510:revLst>
-    <p1510:client id="{355E1A0F-1412-4052-A555-619B258CC9DC}" v="346" dt="2023-11-06T14:50:36.027"/>
-    <p1510:client id="{3B78F90D-0AFB-41FE-99DF-D63564938F48}" v="735" dt="2023-11-06T12:38:04.971"/>
-    <p1510:client id="{6ECA55AD-F5F6-40F3-97F3-A05142DDAD4D}" v="4301" dt="2023-11-06T14:53:24.624"/>
-    <p1510:client id="{7CCB428E-2ACE-4977-814C-7926FE6D05E2}" v="986" dt="2023-11-06T12:58:45.593"/>
-    <p1510:client id="{DD5A922F-014F-42DA-9847-BD4A3E88ECCB}" v="28" dt="2023-11-06T14:29:10.041"/>
-  </p1510:revLst>
-</p1510:revInfo>
+<file path=ppt/changesInfos/changesInfo1.xml><?xml version="1.0" encoding="utf-8"?>
+<pc:chgInfo xmlns:a="http://schemas.openxmlformats.org/drawingml/2006/main" xmlns:r="http://schemas.openxmlformats.org/officeDocument/2006/relationships" xmlns:ac="http://schemas.microsoft.com/office/drawing/2013/main/command" xmlns:pc="http://schemas.microsoft.com/office/powerpoint/2013/main/command">
+  <pc:docChgLst>
+    <pc:chgData name="Stefan, Massimo" userId="c6034213-fdeb-44d8-bf5d-e135aac08adb" providerId="ADAL" clId="{FC775A96-B040-489F-8431-44EF6597B0D9}"/>
+    <pc:docChg chg="modSld">
+      <pc:chgData name="Stefan, Massimo" userId="c6034213-fdeb-44d8-bf5d-e135aac08adb" providerId="ADAL" clId="{FC775A96-B040-489F-8431-44EF6597B0D9}" dt="2023-11-13T14:55:13.304" v="8" actId="115"/>
+      <pc:docMkLst>
+        <pc:docMk/>
+      </pc:docMkLst>
+      <pc:sldChg chg="modSp mod">
+        <pc:chgData name="Stefan, Massimo" userId="c6034213-fdeb-44d8-bf5d-e135aac08adb" providerId="ADAL" clId="{FC775A96-B040-489F-8431-44EF6597B0D9}" dt="2023-11-13T14:49:37.816" v="0" actId="20577"/>
+        <pc:sldMkLst>
+          <pc:docMk/>
+          <pc:sldMk cId="1575348291" sldId="300"/>
+        </pc:sldMkLst>
+        <pc:spChg chg="mod">
+          <ac:chgData name="Stefan, Massimo" userId="c6034213-fdeb-44d8-bf5d-e135aac08adb" providerId="ADAL" clId="{FC775A96-B040-489F-8431-44EF6597B0D9}" dt="2023-11-13T14:49:37.816" v="0" actId="20577"/>
+          <ac:spMkLst>
+            <pc:docMk/>
+            <pc:sldMk cId="1575348291" sldId="300"/>
+            <ac:spMk id="4" creationId="{517EB0BF-2F89-EBFC-1BA9-12B7A9C75DFA}"/>
+          </ac:spMkLst>
+        </pc:spChg>
+      </pc:sldChg>
+      <pc:sldChg chg="modSp mod">
+        <pc:chgData name="Stefan, Massimo" userId="c6034213-fdeb-44d8-bf5d-e135aac08adb" providerId="ADAL" clId="{FC775A96-B040-489F-8431-44EF6597B0D9}" dt="2023-11-13T14:54:39.284" v="5" actId="115"/>
+        <pc:sldMkLst>
+          <pc:docMk/>
+          <pc:sldMk cId="3631820760" sldId="313"/>
+        </pc:sldMkLst>
+        <pc:spChg chg="mod">
+          <ac:chgData name="Stefan, Massimo" userId="c6034213-fdeb-44d8-bf5d-e135aac08adb" providerId="ADAL" clId="{FC775A96-B040-489F-8431-44EF6597B0D9}" dt="2023-11-13T14:54:25.040" v="3" actId="115"/>
+          <ac:spMkLst>
+            <pc:docMk/>
+            <pc:sldMk cId="3631820760" sldId="313"/>
+            <ac:spMk id="3" creationId="{BC72190E-6FB1-D0D1-2C64-F557B62B41A1}"/>
+          </ac:spMkLst>
+        </pc:spChg>
+        <pc:spChg chg="mod">
+          <ac:chgData name="Stefan, Massimo" userId="c6034213-fdeb-44d8-bf5d-e135aac08adb" providerId="ADAL" clId="{FC775A96-B040-489F-8431-44EF6597B0D9}" dt="2023-11-13T14:54:39.284" v="5" actId="115"/>
+          <ac:spMkLst>
+            <pc:docMk/>
+            <pc:sldMk cId="3631820760" sldId="313"/>
+            <ac:spMk id="5" creationId="{01FB18F5-D583-0B44-A39A-D100EFEBC457}"/>
+          </ac:spMkLst>
+        </pc:spChg>
+        <pc:spChg chg="mod">
+          <ac:chgData name="Stefan, Massimo" userId="c6034213-fdeb-44d8-bf5d-e135aac08adb" providerId="ADAL" clId="{FC775A96-B040-489F-8431-44EF6597B0D9}" dt="2023-11-13T14:54:19.711" v="2" actId="115"/>
+          <ac:spMkLst>
+            <pc:docMk/>
+            <pc:sldMk cId="3631820760" sldId="313"/>
+            <ac:spMk id="9" creationId="{321F24B5-8898-8B79-398C-13083F57955C}"/>
+          </ac:spMkLst>
+        </pc:spChg>
+      </pc:sldChg>
+      <pc:sldChg chg="modSp mod">
+        <pc:chgData name="Stefan, Massimo" userId="c6034213-fdeb-44d8-bf5d-e135aac08adb" providerId="ADAL" clId="{FC775A96-B040-489F-8431-44EF6597B0D9}" dt="2023-11-13T14:55:13.304" v="8" actId="115"/>
+        <pc:sldMkLst>
+          <pc:docMk/>
+          <pc:sldMk cId="759523683" sldId="314"/>
+        </pc:sldMkLst>
+        <pc:spChg chg="mod">
+          <ac:chgData name="Stefan, Massimo" userId="c6034213-fdeb-44d8-bf5d-e135aac08adb" providerId="ADAL" clId="{FC775A96-B040-489F-8431-44EF6597B0D9}" dt="2023-11-13T14:55:04.774" v="7" actId="115"/>
+          <ac:spMkLst>
+            <pc:docMk/>
+            <pc:sldMk cId="759523683" sldId="314"/>
+            <ac:spMk id="3" creationId="{BC72190E-6FB1-D0D1-2C64-F557B62B41A1}"/>
+          </ac:spMkLst>
+        </pc:spChg>
+        <pc:spChg chg="mod">
+          <ac:chgData name="Stefan, Massimo" userId="c6034213-fdeb-44d8-bf5d-e135aac08adb" providerId="ADAL" clId="{FC775A96-B040-489F-8431-44EF6597B0D9}" dt="2023-11-13T14:55:13.304" v="8" actId="115"/>
+          <ac:spMkLst>
+            <pc:docMk/>
+            <pc:sldMk cId="759523683" sldId="314"/>
+            <ac:spMk id="5" creationId="{01FB18F5-D583-0B44-A39A-D100EFEBC457}"/>
+          </ac:spMkLst>
+        </pc:spChg>
+        <pc:spChg chg="mod">
+          <ac:chgData name="Stefan, Massimo" userId="c6034213-fdeb-44d8-bf5d-e135aac08adb" providerId="ADAL" clId="{FC775A96-B040-489F-8431-44EF6597B0D9}" dt="2023-11-13T14:54:51.203" v="6" actId="115"/>
+          <ac:spMkLst>
+            <pc:docMk/>
+            <pc:sldMk cId="759523683" sldId="314"/>
+            <ac:spMk id="9" creationId="{321F24B5-8898-8B79-398C-13083F57955C}"/>
+          </ac:spMkLst>
+        </pc:spChg>
+      </pc:sldChg>
+    </pc:docChg>
+  </pc:docChgLst>
+</pc:chgInfo>
 </file>
 
 <file path=ppt/diagrams/colors1.xml><?xml version="1.0" encoding="utf-8"?>
@@ -9687,7 +9766,7 @@
             <a:pPr rtl="0"/>
             <a:fld id="{55E73A45-0DF1-4894-8E43-0E96F5A8B3CF}" type="datetime1">
               <a:rPr lang="it-IT" smtClean="0"/>
-              <a:t>09/11/2023</a:t>
+              <a:t>13/11/2023</a:t>
             </a:fld>
             <a:endParaRPr lang="it-IT"/>
           </a:p>
@@ -9857,7 +9936,7 @@
             <a:pPr rtl="0"/>
             <a:fld id="{02DA610A-5BE1-4E72-B459-4F60E81BF990}" type="datetime1">
               <a:rPr lang="it-IT" noProof="0" smtClean="0"/>
-              <a:t>09/11/2023</a:t>
+              <a:t>13/11/2023</a:t>
             </a:fld>
             <a:endParaRPr lang="it-IT" noProof="0"/>
           </a:p>
@@ -10395,7 +10474,7 @@
           <a:effectLst/>
           <a:extLst>
             <a:ext uri="{91240B29-F687-4f45-9708-019B960494DF}">
-              <a14:hiddenLine xmlns="" xmlns:a14="http://schemas.microsoft.com/office/drawing/2010/main" w="9525">
+              <a14:hiddenLine xmlns:a14="http://schemas.microsoft.com/office/drawing/2010/main" xmlns="" w="9525">
                 <a:solidFill>
                   <a:srgbClr val="000000"/>
                 </a:solidFill>
@@ -10588,7 +10667,7 @@
             <a:pPr rtl="0"/>
             <a:fld id="{3DE8F425-65FB-4F73-B7E6-51845DB56988}" type="datetime1">
               <a:rPr lang="it-IT" noProof="0" smtClean="0"/>
-              <a:t>09/11/2023</a:t>
+              <a:t>13/11/2023</a:t>
             </a:fld>
             <a:endParaRPr lang="it-IT" noProof="0"/>
           </a:p>
@@ -10905,7 +10984,7 @@
             <a:pPr rtl="0"/>
             <a:fld id="{7C9F913F-E36F-46F5-A02F-CE5BA93DC3B2}" type="datetime1">
               <a:rPr lang="it-IT" noProof="0" smtClean="0"/>
-              <a:t>09/11/2023</a:t>
+              <a:t>13/11/2023</a:t>
             </a:fld>
             <a:endParaRPr lang="it-IT" noProof="0"/>
           </a:p>
@@ -11392,7 +11471,7 @@
             <a:pPr rtl="0"/>
             <a:fld id="{5DF7814C-A8B9-4B71-A6A3-5693827C9B87}" type="datetime1">
               <a:rPr lang="it-IT" noProof="0" smtClean="0"/>
-              <a:t>09/11/2023</a:t>
+              <a:t>13/11/2023</a:t>
             </a:fld>
             <a:endParaRPr lang="it-IT" noProof="0"/>
           </a:p>
@@ -11760,7 +11839,7 @@
             <a:pPr rtl="0"/>
             <a:fld id="{764A0EAF-CB98-489E-9273-1EEFE5F2D4E9}" type="datetime1">
               <a:rPr lang="it-IT" noProof="0" smtClean="0"/>
-              <a:t>09/11/2023</a:t>
+              <a:t>13/11/2023</a:t>
             </a:fld>
             <a:endParaRPr lang="it-IT" noProof="0"/>
           </a:p>
@@ -11913,7 +11992,7 @@
           <a:ln/>
           <a:extLst>
             <a:ext uri="{91240B29-F687-4f45-9708-019B960494DF}">
-              <a14:hiddenLine xmlns="" xmlns:a14="http://schemas.microsoft.com/office/drawing/2010/main" w="9525">
+              <a14:hiddenLine xmlns:a14="http://schemas.microsoft.com/office/drawing/2010/main" xmlns="" w="9525">
                 <a:solidFill>
                   <a:srgbClr val="000000"/>
                 </a:solidFill>
@@ -12031,7 +12110,7 @@
             <a:pPr rtl="0"/>
             <a:fld id="{972791A8-EBCC-4B66-B3E0-6522C5E1003A}" type="datetime1">
               <a:rPr lang="it-IT" noProof="0" smtClean="0"/>
-              <a:t>09/11/2023</a:t>
+              <a:t>13/11/2023</a:t>
             </a:fld>
             <a:endParaRPr lang="it-IT" noProof="0"/>
           </a:p>
@@ -12186,7 +12265,7 @@
           <a:ln/>
           <a:extLst>
             <a:ext uri="{91240B29-F687-4f45-9708-019B960494DF}">
-              <a14:hiddenLine xmlns="" xmlns:a14="http://schemas.microsoft.com/office/drawing/2010/main" w="9525">
+              <a14:hiddenLine xmlns:a14="http://schemas.microsoft.com/office/drawing/2010/main" xmlns="" w="9525">
                 <a:solidFill>
                   <a:srgbClr val="000000"/>
                 </a:solidFill>
@@ -12314,7 +12393,7 @@
             <a:pPr rtl="0"/>
             <a:fld id="{8A27F24F-440F-4BA9-A565-EBEF6318A6D6}" type="datetime1">
               <a:rPr lang="it-IT" noProof="0" smtClean="0"/>
-              <a:t>09/11/2023</a:t>
+              <a:t>13/11/2023</a:t>
             </a:fld>
             <a:endParaRPr lang="it-IT" noProof="0"/>
           </a:p>
@@ -12467,7 +12546,7 @@
           <a:ln/>
           <a:extLst>
             <a:ext uri="{91240B29-F687-4f45-9708-019B960494DF}">
-              <a14:hiddenLine xmlns="" xmlns:a14="http://schemas.microsoft.com/office/drawing/2010/main" w="9525">
+              <a14:hiddenLine xmlns:a14="http://schemas.microsoft.com/office/drawing/2010/main" xmlns="" w="9525">
                 <a:solidFill>
                   <a:srgbClr val="000000"/>
                 </a:solidFill>
@@ -12595,7 +12674,7 @@
             <a:pPr rtl="0"/>
             <a:fld id="{5BE6927C-835E-401F-B7DC-9A15959A0483}" type="datetime1">
               <a:rPr lang="it-IT" noProof="0" smtClean="0"/>
-              <a:t>09/11/2023</a:t>
+              <a:t>13/11/2023</a:t>
             </a:fld>
             <a:endParaRPr lang="it-IT" noProof="0"/>
           </a:p>
@@ -12937,7 +13016,7 @@
             <a:pPr rtl="0"/>
             <a:fld id="{87A8D49F-D8B4-4BC3-849F-05910591011C}" type="datetime1">
               <a:rPr lang="it-IT" noProof="0" smtClean="0"/>
-              <a:t>09/11/2023</a:t>
+              <a:t>13/11/2023</a:t>
             </a:fld>
             <a:endParaRPr lang="it-IT" noProof="0"/>
           </a:p>
@@ -13090,7 +13169,7 @@
           <a:ln/>
           <a:extLst>
             <a:ext uri="{91240B29-F687-4f45-9708-019B960494DF}">
-              <a14:hiddenLine xmlns="" xmlns:a14="http://schemas.microsoft.com/office/drawing/2010/main" w="9525">
+              <a14:hiddenLine xmlns:a14="http://schemas.microsoft.com/office/drawing/2010/main" xmlns="" w="9525">
                 <a:solidFill>
                   <a:srgbClr val="000000"/>
                 </a:solidFill>
@@ -13273,7 +13352,7 @@
             <a:pPr rtl="0"/>
             <a:fld id="{38E6E156-F3E7-4ECB-BEF7-471270FD5492}" type="datetime1">
               <a:rPr lang="it-IT" noProof="0" smtClean="0"/>
-              <a:t>09/11/2023</a:t>
+              <a:t>13/11/2023</a:t>
             </a:fld>
             <a:endParaRPr lang="it-IT" noProof="0"/>
           </a:p>
@@ -13426,7 +13505,7 @@
           <a:ln/>
           <a:extLst>
             <a:ext uri="{91240B29-F687-4f45-9708-019B960494DF}">
-              <a14:hiddenLine xmlns="" xmlns:a14="http://schemas.microsoft.com/office/drawing/2010/main" w="9525">
+              <a14:hiddenLine xmlns:a14="http://schemas.microsoft.com/office/drawing/2010/main" xmlns="" w="9525">
                 <a:solidFill>
                   <a:srgbClr val="000000"/>
                 </a:solidFill>
@@ -13747,7 +13826,7 @@
             <a:pPr rtl="0"/>
             <a:fld id="{63B26FFA-EA8B-4F7D-9B9E-A64E1B635BB0}" type="datetime1">
               <a:rPr lang="it-IT" noProof="0" smtClean="0"/>
-              <a:t>09/11/2023</a:t>
+              <a:t>13/11/2023</a:t>
             </a:fld>
             <a:endParaRPr lang="it-IT" noProof="0"/>
           </a:p>
@@ -13900,7 +13979,7 @@
           <a:ln/>
           <a:extLst>
             <a:ext uri="{91240B29-F687-4f45-9708-019B960494DF}">
-              <a14:hiddenLine xmlns="" xmlns:a14="http://schemas.microsoft.com/office/drawing/2010/main" w="9525">
+              <a14:hiddenLine xmlns:a14="http://schemas.microsoft.com/office/drawing/2010/main" xmlns="" w="9525">
                 <a:solidFill>
                   <a:srgbClr val="000000"/>
                 </a:solidFill>
@@ -13967,7 +14046,7 @@
             <a:pPr rtl="0"/>
             <a:fld id="{6825DBEC-70E7-4AA4-965C-F525A609E9AE}" type="datetime1">
               <a:rPr lang="it-IT" noProof="0" smtClean="0"/>
-              <a:t>09/11/2023</a:t>
+              <a:t>13/11/2023</a:t>
             </a:fld>
             <a:endParaRPr lang="it-IT" noProof="0"/>
           </a:p>
@@ -14061,7 +14140,7 @@
             <a:pPr rtl="0"/>
             <a:fld id="{7B74D573-1F3C-4902-8491-F97242D93E75}" type="datetime1">
               <a:rPr lang="it-IT" noProof="0" smtClean="0"/>
-              <a:t>09/11/2023</a:t>
+              <a:t>13/11/2023</a:t>
             </a:fld>
             <a:endParaRPr lang="it-IT" noProof="0"/>
           </a:p>
@@ -14327,7 +14406,7 @@
           <a:ln/>
           <a:extLst>
             <a:ext uri="{91240B29-F687-4f45-9708-019B960494DF}">
-              <a14:hiddenLine xmlns="" xmlns:a14="http://schemas.microsoft.com/office/drawing/2010/main" w="9525">
+              <a14:hiddenLine xmlns:a14="http://schemas.microsoft.com/office/drawing/2010/main" xmlns="" w="9525">
                 <a:solidFill>
                   <a:srgbClr val="000000"/>
                 </a:solidFill>
@@ -14526,7 +14605,7 @@
             <a:pPr rtl="0"/>
             <a:fld id="{A30FBBD8-A361-4959-8D14-39C608FA888E}" type="datetime1">
               <a:rPr lang="it-IT" noProof="0" smtClean="0"/>
-              <a:t>09/11/2023</a:t>
+              <a:t>13/11/2023</a:t>
             </a:fld>
             <a:endParaRPr lang="it-IT" noProof="0"/>
           </a:p>
@@ -14838,7 +14917,7 @@
             <a:pPr rtl="0"/>
             <a:fld id="{894CB4E0-E216-4DD2-9502-137D94265CF1}" type="datetime1">
               <a:rPr lang="it-IT" noProof="0" smtClean="0"/>
-              <a:t>09/11/2023</a:t>
+              <a:t>13/11/2023</a:t>
             </a:fld>
             <a:endParaRPr lang="it-IT" noProof="0"/>
           </a:p>
@@ -15112,7 +15191,7 @@
             <a:pPr rtl="0"/>
             <a:fld id="{4A8B5E6C-D5BE-4279-B6CC-CE92E3390607}" type="datetime1">
               <a:rPr lang="it-IT" noProof="0" smtClean="0"/>
-              <a:t>09/11/2023</a:t>
+              <a:t>13/11/2023</a:t>
             </a:fld>
             <a:endParaRPr lang="it-IT" noProof="0"/>
           </a:p>
@@ -21814,7 +21893,7 @@
           <a:effectLst/>
           <a:extLst>
             <a:ext uri="{91240B29-F687-4f45-9708-019B960494DF}">
-              <a14:hiddenLine xmlns="" xmlns:p14="http://schemas.microsoft.com/office/powerpoint/2010/main" xmlns:a16="http://schemas.microsoft.com/office/drawing/2014/main" xmlns:a14="http://schemas.microsoft.com/office/drawing/2010/main" w="9525">
+              <a14:hiddenLine xmlns:a14="http://schemas.microsoft.com/office/drawing/2010/main" xmlns:a16="http://schemas.microsoft.com/office/drawing/2014/main" xmlns:p14="http://schemas.microsoft.com/office/powerpoint/2010/main" xmlns="" w="9525">
                 <a:solidFill>
                   <a:srgbClr val="000000"/>
                 </a:solidFill>
@@ -25989,30 +26068,30 @@
             <a:p>
               <a:pPr algn="ctr"/>
               <a:r>
-                <a:rPr lang="en-GB" b="1"/>
-                <a:t>Psycholinguistic features</a:t>
+                <a:rPr lang="en-GB" b="1" dirty="0"/>
+                <a:t>Psycholinguistic Features</a:t>
               </a:r>
             </a:p>
             <a:p>
-              <a:endParaRPr lang="en-GB"/>
+              <a:endParaRPr lang="en-GB" dirty="0"/>
             </a:p>
             <a:p>
               <a:r>
-                <a:rPr lang="it-IT"/>
+                <a:rPr lang="it-IT" dirty="0"/>
                 <a:t>💡</a:t>
               </a:r>
               <a:r>
-                <a:rPr lang="en-GB"/>
+                <a:rPr lang="en-GB" dirty="0"/>
                 <a:t>Features derived from psychological research on language processing (concreteness, valence, arousal, …)</a:t>
               </a:r>
             </a:p>
             <a:p>
               <a:r>
-                <a:rPr lang="it-IT"/>
+                <a:rPr lang="it-IT" dirty="0"/>
                 <a:t>🛠️</a:t>
               </a:r>
               <a:r>
-                <a:rPr lang="en-GB"/>
+                <a:rPr lang="en-GB" dirty="0"/>
                 <a:t>Predict further emotional impact</a:t>
               </a:r>
             </a:p>
@@ -26860,33 +26939,33 @@
             <a:p>
               <a:pPr algn="ctr"/>
               <a:r>
-                <a:rPr lang="en-GB" b="1"/>
+                <a:rPr lang="en-GB" b="1" dirty="0"/>
                 <a:t>Negation and Intensifiers</a:t>
               </a:r>
             </a:p>
             <a:p>
-              <a:endParaRPr lang="en-GB"/>
+              <a:endParaRPr lang="en-GB" dirty="0"/>
             </a:p>
             <a:p>
               <a:r>
-                <a:rPr lang="it-IT"/>
+                <a:rPr lang="it-IT" dirty="0"/>
                 <a:t>💡</a:t>
               </a:r>
               <a:r>
-                <a:rPr lang="en-GB"/>
+                <a:rPr lang="en-GB" dirty="0"/>
                 <a:t>Words modifying intensity of emotion or reversing polarity</a:t>
               </a:r>
             </a:p>
             <a:p>
-              <a:endParaRPr lang="en-GB"/>
+              <a:endParaRPr lang="en-GB" dirty="0"/>
             </a:p>
             <a:p>
               <a:r>
-                <a:rPr lang="it-IT"/>
+                <a:rPr lang="it-IT" dirty="0"/>
                 <a:t>🛠️</a:t>
               </a:r>
               <a:r>
-                <a:rPr lang="en-GB"/>
+                <a:rPr lang="en-GB" dirty="0"/>
                 <a:t>Critical for accurate mood detection</a:t>
               </a:r>
             </a:p>
@@ -27503,51 +27582,55 @@
           <a:p>
             <a:pPr algn="ctr"/>
             <a:r>
-              <a:rPr lang="it-IT" sz="4000" b="1"/>
+              <a:rPr lang="it-IT" sz="4000" b="1" dirty="0"/>
               <a:t>⚖️</a:t>
             </a:r>
-            <a:endParaRPr lang="en-GB" sz="4000" b="1"/>
+            <a:endParaRPr lang="en-GB" sz="4000" b="1" dirty="0"/>
           </a:p>
           <a:p>
             <a:pPr algn="ctr"/>
             <a:r>
-              <a:rPr lang="en-GB" b="1"/>
+              <a:rPr lang="en-GB" b="1" dirty="0"/>
               <a:t>Bias and Fairness</a:t>
             </a:r>
-            <a:endParaRPr lang="en-GB"/>
-          </a:p>
-          <a:p>
-            <a:endParaRPr lang="en-GB"/>
-          </a:p>
-          <a:p>
-            <a:r>
-              <a:rPr lang="it-IT" sz="1600">
+            <a:endParaRPr lang="en-GB" dirty="0"/>
+          </a:p>
+          <a:p>
+            <a:endParaRPr lang="en-GB" dirty="0"/>
+          </a:p>
+          <a:p>
+            <a:r>
+              <a:rPr lang="it-IT" sz="1600" dirty="0">
                 <a:ea typeface="+mn-lt"/>
                 <a:cs typeface="+mn-lt"/>
               </a:rPr>
               <a:t>⚠️</a:t>
             </a:r>
             <a:r>
-              <a:rPr lang="en-GB" sz="1600"/>
+              <a:rPr lang="en-GB" sz="1600" dirty="0"/>
               <a:t> Systematic errors that create unfair outcomes</a:t>
             </a:r>
           </a:p>
           <a:p>
-            <a:endParaRPr lang="en-GB"/>
-          </a:p>
-          <a:p>
-            <a:r>
-              <a:rPr lang="it-IT" sz="1600"/>
+            <a:endParaRPr lang="en-GB" dirty="0"/>
+          </a:p>
+          <a:p>
+            <a:r>
+              <a:rPr lang="it-IT" sz="1600" dirty="0"/>
               <a:t>🧑🏽‍🏫 </a:t>
             </a:r>
             <a:r>
-              <a:rPr lang="en-GB" sz="1600"/>
-              <a:t>Misinterpreting expressions of emotions in a certain language, leading to incorrect assessments of mood</a:t>
-            </a:r>
-          </a:p>
-          <a:p>
-            <a:r>
-              <a:rPr lang="en-GB" sz="1600">
+              <a:rPr lang="en-GB" sz="1600" u="sng" dirty="0"/>
+              <a:t>Misinterpreting expressions</a:t>
+            </a:r>
+            <a:r>
+              <a:rPr lang="en-GB" sz="1600" dirty="0"/>
+              <a:t> of emotions in a certain language, leading to incorrect assessments of mood</a:t>
+            </a:r>
+          </a:p>
+          <a:p>
+            <a:r>
+              <a:rPr lang="en-GB" sz="1600" dirty="0">
                 <a:ea typeface="+mn-lt"/>
                 <a:cs typeface="+mn-lt"/>
               </a:rPr>
@@ -27556,13 +27639,13 @@
           </a:p>
           <a:p>
             <a:r>
-              <a:rPr lang="en-GB" sz="1600">
+              <a:rPr lang="en-GB" sz="1600" dirty="0">
                 <a:ea typeface="+mn-lt"/>
                 <a:cs typeface="+mn-lt"/>
               </a:rPr>
               <a:t>🟢 Diversifying training data</a:t>
             </a:r>
-            <a:endParaRPr lang="en-GB"/>
+            <a:endParaRPr lang="en-GB" dirty="0"/>
           </a:p>
         </p:txBody>
       </p:sp>
@@ -27596,63 +27679,70 @@
           <a:p>
             <a:pPr algn="ctr"/>
             <a:r>
-              <a:rPr lang="it-IT" sz="4000" b="1"/>
+              <a:rPr lang="it-IT" sz="4000" b="1" dirty="0"/>
               <a:t>🎭</a:t>
             </a:r>
           </a:p>
           <a:p>
             <a:pPr algn="ctr"/>
             <a:r>
-              <a:rPr lang="en-GB" b="1"/>
+              <a:rPr lang="en-GB" b="1" dirty="0"/>
               <a:t>Emotional Manipulation</a:t>
             </a:r>
           </a:p>
           <a:p>
-            <a:endParaRPr lang="en-GB"/>
-          </a:p>
-          <a:p>
-            <a:r>
-              <a:rPr lang="it-IT" sz="1600">
+            <a:endParaRPr lang="en-GB" dirty="0"/>
+          </a:p>
+          <a:p>
+            <a:r>
+              <a:rPr lang="it-IT" sz="1600" dirty="0">
                 <a:ea typeface="+mn-lt"/>
                 <a:cs typeface="+mn-lt"/>
               </a:rPr>
               <a:t>⚠️</a:t>
             </a:r>
             <a:r>
-              <a:rPr lang="en-GB" sz="1600">
+              <a:rPr lang="en-GB" sz="1600" dirty="0">
                 <a:ea typeface="+mn-lt"/>
                 <a:cs typeface="+mn-lt"/>
               </a:rPr>
               <a:t> </a:t>
             </a:r>
             <a:r>
-              <a:rPr lang="en-GB" sz="1600"/>
+              <a:rPr lang="en-GB" sz="1600" dirty="0"/>
               <a:t>Systems may use mood detection to influence users' behaviour</a:t>
             </a:r>
-            <a:endParaRPr lang="en-GB"/>
-          </a:p>
-          <a:p>
-            <a:endParaRPr lang="en-GB"/>
-          </a:p>
-          <a:p>
-            <a:r>
-              <a:rPr lang="it-IT" sz="1600">
+            <a:endParaRPr lang="en-GB" dirty="0"/>
+          </a:p>
+          <a:p>
+            <a:endParaRPr lang="en-GB" dirty="0"/>
+          </a:p>
+          <a:p>
+            <a:r>
+              <a:rPr lang="it-IT" sz="1600" dirty="0">
                 <a:ea typeface="+mn-lt"/>
                 <a:cs typeface="+mn-lt"/>
               </a:rPr>
               <a:t>🧑🏽‍🏫  </a:t>
             </a:r>
             <a:r>
-              <a:rPr lang="en-GB" sz="1600">
+              <a:rPr lang="en-GB" sz="1600" dirty="0">
                 <a:ea typeface="+mn-lt"/>
                 <a:cs typeface="+mn-lt"/>
               </a:rPr>
-              <a:t>A music streaming service plays music according to mood to maximize the users' time on the app</a:t>
-            </a:r>
-          </a:p>
-          <a:p>
-            <a:r>
-              <a:rPr lang="it-IT" sz="1600">
+              <a:t>A music streaming service plays music according to mood to </a:t>
+            </a:r>
+            <a:r>
+              <a:rPr lang="en-GB" sz="1600" u="sng" dirty="0">
+                <a:ea typeface="+mn-lt"/>
+                <a:cs typeface="+mn-lt"/>
+              </a:rPr>
+              <a:t>maximize the users' time on the app</a:t>
+            </a:r>
+          </a:p>
+          <a:p>
+            <a:r>
+              <a:rPr lang="it-IT" sz="1600" dirty="0">
                 <a:ea typeface="+mn-lt"/>
                 <a:cs typeface="+mn-lt"/>
                 <a:sym typeface="Wingdings" panose="05000000000000000000" pitchFamily="2" charset="2"/>
@@ -27660,7 +27750,7 @@
               <a:t>🔴 </a:t>
             </a:r>
             <a:r>
-              <a:rPr lang="en-GB" sz="1600">
+              <a:rPr lang="en-GB" sz="1600" dirty="0">
                 <a:ea typeface="+mn-lt"/>
                 <a:cs typeface="+mn-lt"/>
                 <a:sym typeface="Wingdings" panose="05000000000000000000" pitchFamily="2" charset="2"/>
@@ -27668,7 +27758,7 @@
               <a:t>User</a:t>
             </a:r>
             <a:r>
-              <a:rPr lang="it-IT" sz="1600">
+              <a:rPr lang="it-IT" sz="1600" dirty="0">
                 <a:ea typeface="+mn-lt"/>
                 <a:cs typeface="+mn-lt"/>
                 <a:sym typeface="Wingdings" panose="05000000000000000000" pitchFamily="2" charset="2"/>
@@ -27676,7 +27766,7 @@
               <a:t> </a:t>
             </a:r>
             <a:r>
-              <a:rPr lang="en-GB" sz="1600">
+              <a:rPr lang="en-GB" sz="1600" dirty="0">
                 <a:ea typeface="+mn-lt"/>
                 <a:cs typeface="+mn-lt"/>
                 <a:sym typeface="Wingdings" panose="05000000000000000000" pitchFamily="2" charset="2"/>
@@ -27686,7 +27776,7 @@
           </a:p>
           <a:p>
             <a:r>
-              <a:rPr lang="it-IT" sz="1600">
+              <a:rPr lang="it-IT" sz="1600" dirty="0">
                 <a:ea typeface="+mn-lt"/>
                 <a:cs typeface="+mn-lt"/>
                 <a:sym typeface="Wingdings" panose="05000000000000000000" pitchFamily="2" charset="2"/>
@@ -27694,14 +27784,14 @@
               <a:t>🟢 </a:t>
             </a:r>
             <a:r>
-              <a:rPr lang="en-GB" sz="1600">
+              <a:rPr lang="en-GB" sz="1600" dirty="0">
                 <a:ea typeface="+mn-lt"/>
                 <a:cs typeface="+mn-lt"/>
                 <a:sym typeface="Wingdings" panose="05000000000000000000" pitchFamily="2" charset="2"/>
               </a:rPr>
               <a:t>Establishing ethical guidelines</a:t>
             </a:r>
-            <a:endParaRPr lang="en-GB"/>
+            <a:endParaRPr lang="en-GB" dirty="0"/>
           </a:p>
         </p:txBody>
       </p:sp>
@@ -27735,53 +27825,61 @@
           <a:p>
             <a:pPr algn="ctr"/>
             <a:r>
-              <a:rPr lang="it-IT" sz="4000"/>
+              <a:rPr lang="it-IT" sz="4000" dirty="0"/>
               <a:t>🧠⚕️</a:t>
             </a:r>
           </a:p>
           <a:p>
             <a:pPr algn="ctr"/>
             <a:r>
-              <a:rPr lang="en-GB" b="1"/>
+              <a:rPr lang="en-GB" b="1" dirty="0"/>
               <a:t>Mental Health</a:t>
             </a:r>
           </a:p>
           <a:p>
             <a:pPr algn="ctr"/>
-            <a:endParaRPr lang="en-GB"/>
-          </a:p>
-          <a:p>
-            <a:r>
-              <a:rPr lang="it-IT" sz="1600"/>
+            <a:endParaRPr lang="en-GB" dirty="0"/>
+          </a:p>
+          <a:p>
+            <a:r>
+              <a:rPr lang="it-IT" sz="1600" dirty="0"/>
               <a:t>⚠️ </a:t>
             </a:r>
             <a:r>
-              <a:rPr lang="en-GB" sz="1600"/>
+              <a:rPr lang="en-GB" sz="1600" dirty="0"/>
               <a:t>Systems may obtain information regarding the mental state of a user</a:t>
             </a:r>
           </a:p>
           <a:p>
-            <a:endParaRPr lang="en-GB" sz="1600"/>
-          </a:p>
-          <a:p>
-            <a:r>
-              <a:rPr lang="it-IT" sz="1600"/>
+            <a:endParaRPr lang="en-GB" sz="1600" dirty="0"/>
+          </a:p>
+          <a:p>
+            <a:r>
+              <a:rPr lang="it-IT" sz="1600" dirty="0"/>
               <a:t>🧑🏽‍🏫</a:t>
             </a:r>
             <a:r>
-              <a:rPr lang="en-GB" sz="1600"/>
-              <a:t> An app that can alert a specialist in case it detects an unstable mental state in the user</a:t>
-            </a:r>
-          </a:p>
-          <a:p>
-            <a:r>
-              <a:rPr lang="en-GB" sz="1600"/>
+              <a:rPr lang="en-GB" sz="1600" dirty="0"/>
+              <a:t> An app that can alert a specialist in case it </a:t>
+            </a:r>
+            <a:r>
+              <a:rPr lang="en-GB" sz="1600" u="sng" dirty="0"/>
+              <a:t>detects an unstable mental state</a:t>
+            </a:r>
+            <a:r>
+              <a:rPr lang="en-GB" sz="1600" dirty="0"/>
+              <a:t> in the user</a:t>
+            </a:r>
+          </a:p>
+          <a:p>
+            <a:r>
+              <a:rPr lang="en-GB" sz="1600" dirty="0"/>
               <a:t>🔴 Misinterpretation</a:t>
             </a:r>
           </a:p>
           <a:p>
             <a:r>
-              <a:rPr lang="en-GB" sz="1600"/>
+              <a:rPr lang="en-GB" sz="1600" dirty="0"/>
               <a:t>🟢 Ensure that these systems are always carefully monitored by humans</a:t>
             </a:r>
           </a:p>
@@ -27872,7 +27970,7 @@
         <p:spPr>
           <a:xfrm>
             <a:off x="810000" y="2340000"/>
-            <a:ext cx="3466800" cy="4216539"/>
+            <a:ext cx="3466800" cy="3970318"/>
           </a:xfrm>
           <a:prstGeom prst="rect">
             <a:avLst/>
@@ -27887,49 +27985,57 @@
           <a:p>
             <a:pPr algn="ctr"/>
             <a:r>
-              <a:rPr lang="it-IT" sz="4000" b="1"/>
+              <a:rPr lang="it-IT" sz="4000" b="1" dirty="0"/>
               <a:t>📈🔎</a:t>
             </a:r>
-            <a:endParaRPr lang="en-GB" sz="4000" b="1"/>
+            <a:endParaRPr lang="en-GB" sz="4000" b="1" dirty="0"/>
           </a:p>
           <a:p>
             <a:pPr algn="ctr"/>
             <a:r>
-              <a:rPr lang="en-GB" b="1"/>
+              <a:rPr lang="en-GB" b="1" dirty="0"/>
               <a:t>Accountability and Transparency</a:t>
             </a:r>
           </a:p>
           <a:p>
-            <a:endParaRPr lang="en-GB" sz="1600"/>
-          </a:p>
-          <a:p>
-            <a:r>
-              <a:rPr lang="it-IT" sz="1600"/>
+            <a:endParaRPr lang="en-GB" sz="1600" dirty="0"/>
+          </a:p>
+          <a:p>
+            <a:r>
+              <a:rPr lang="it-IT" sz="1600" dirty="0"/>
               <a:t>⚠️ </a:t>
             </a:r>
             <a:r>
-              <a:rPr lang="en-GB" sz="1600"/>
+              <a:rPr lang="en-GB" sz="1600" dirty="0"/>
               <a:t>Systems are not clear in explaining their decision and are not responsible for their mistakes</a:t>
             </a:r>
           </a:p>
           <a:p>
-            <a:endParaRPr lang="en-GB" sz="1600"/>
-          </a:p>
-          <a:p>
-            <a:r>
-              <a:rPr lang="en-GB" sz="1600"/>
-              <a:t>🧑🏽‍🏫 A candidate can be rejected based on a wrong mood detection</a:t>
-            </a:r>
-          </a:p>
-          <a:p>
-            <a:r>
-              <a:rPr lang="en-GB" sz="1600"/>
+            <a:endParaRPr lang="en-GB" sz="1600" dirty="0"/>
+          </a:p>
+          <a:p>
+            <a:r>
+              <a:rPr lang="en-GB" sz="1600" dirty="0"/>
+              <a:t>🧑🏽‍🏫 A candidate can be </a:t>
+            </a:r>
+            <a:r>
+              <a:rPr lang="en-GB" sz="1600" u="sng" dirty="0"/>
+              <a:t>rejected</a:t>
+            </a:r>
+            <a:r>
+              <a:rPr lang="en-GB" sz="1600" dirty="0"/>
+              <a:t> based on a wrong mood detection</a:t>
+            </a:r>
+          </a:p>
+          <a:p>
+            <a:r>
+              <a:rPr lang="en-GB" sz="1600" dirty="0"/>
               <a:t>🔴 Mistrust and harm</a:t>
             </a:r>
           </a:p>
           <a:p>
             <a:r>
-              <a:rPr lang="en-GB" sz="1600"/>
+              <a:rPr lang="en-GB" sz="1600" dirty="0"/>
               <a:t>🟢 Strict regulations on such systems</a:t>
             </a:r>
           </a:p>
@@ -27950,7 +28056,7 @@
         <p:spPr>
           <a:xfrm>
             <a:off x="4363200" y="2340000"/>
-            <a:ext cx="3466800" cy="4216539"/>
+            <a:ext cx="3466800" cy="3693319"/>
           </a:xfrm>
           <a:prstGeom prst="rect">
             <a:avLst/>
@@ -27965,66 +28071,70 @@
           <a:p>
             <a:pPr algn="ctr"/>
             <a:r>
-              <a:rPr lang="it-IT" sz="4000" b="1"/>
+              <a:rPr lang="it-IT" sz="4000" b="1" dirty="0"/>
               <a:t>📹</a:t>
             </a:r>
           </a:p>
           <a:p>
             <a:pPr algn="ctr"/>
             <a:r>
-              <a:rPr lang="en-GB" b="1"/>
+              <a:rPr lang="en-GB" b="1" dirty="0"/>
               <a:t>Surveillance and Monitoring</a:t>
             </a:r>
           </a:p>
           <a:p>
-            <a:endParaRPr lang="it-IT" sz="1600"/>
-          </a:p>
-          <a:p>
-            <a:r>
-              <a:rPr lang="it-IT" sz="1600"/>
+            <a:endParaRPr lang="it-IT" sz="1600" dirty="0"/>
+          </a:p>
+          <a:p>
+            <a:r>
+              <a:rPr lang="it-IT" sz="1600" dirty="0"/>
               <a:t>⚠️ </a:t>
             </a:r>
             <a:r>
-              <a:rPr lang="en-GB" sz="1600"/>
+              <a:rPr lang="en-GB" sz="1600" dirty="0"/>
               <a:t>LLMs can facilitate the systematic observation of individuals</a:t>
             </a:r>
-            <a:endParaRPr lang="it-IT" sz="1600"/>
-          </a:p>
-          <a:p>
-            <a:endParaRPr lang="it-IT" sz="1600"/>
-          </a:p>
-          <a:p>
-            <a:r>
-              <a:rPr lang="it-IT" sz="1600"/>
+            <a:endParaRPr lang="it-IT" sz="1600" dirty="0"/>
+          </a:p>
+          <a:p>
+            <a:endParaRPr lang="it-IT" sz="1600" dirty="0"/>
+          </a:p>
+          <a:p>
+            <a:r>
+              <a:rPr lang="it-IT" sz="1600" dirty="0"/>
               <a:t>🧑🏽‍🏫 </a:t>
             </a:r>
             <a:r>
-              <a:rPr lang="en-GB" sz="1600"/>
-              <a:t>Monitoring employee communications leading to punishment</a:t>
-            </a:r>
-            <a:endParaRPr lang="it-IT" sz="1600"/>
-          </a:p>
-          <a:p>
-            <a:r>
-              <a:rPr lang="it-IT" sz="1600"/>
+              <a:rPr lang="en-GB" sz="1600" u="sng" dirty="0"/>
+              <a:t>Monitoring employee communications</a:t>
+            </a:r>
+            <a:r>
+              <a:rPr lang="en-GB" sz="1600" dirty="0"/>
+              <a:t> leading to punishment</a:t>
+            </a:r>
+            <a:endParaRPr lang="it-IT" sz="1600" dirty="0"/>
+          </a:p>
+          <a:p>
+            <a:r>
+              <a:rPr lang="it-IT" sz="1600" dirty="0"/>
               <a:t>🔴</a:t>
             </a:r>
             <a:r>
-              <a:rPr lang="en-GB" sz="1600"/>
+              <a:rPr lang="en-GB" sz="1600" dirty="0"/>
               <a:t>Fear and self-censorship</a:t>
             </a:r>
-            <a:endParaRPr lang="it-IT" sz="1600"/>
-          </a:p>
-          <a:p>
-            <a:r>
-              <a:rPr lang="it-IT" sz="1600"/>
+            <a:endParaRPr lang="it-IT" sz="1600" dirty="0"/>
+          </a:p>
+          <a:p>
+            <a:r>
+              <a:rPr lang="it-IT" sz="1600" dirty="0"/>
               <a:t>🟢</a:t>
             </a:r>
             <a:r>
-              <a:rPr lang="en-GB" sz="1600"/>
+              <a:rPr lang="en-GB" sz="1600" dirty="0"/>
               <a:t>Strict regulations on surveillance</a:t>
             </a:r>
-            <a:endParaRPr lang="en-GB" sz="1400"/>
+            <a:endParaRPr lang="en-GB" sz="1400" dirty="0"/>
           </a:p>
         </p:txBody>
       </p:sp>
@@ -28058,57 +28168,65 @@
           <a:p>
             <a:pPr algn="ctr"/>
             <a:r>
-              <a:rPr lang="it-IT" sz="4000"/>
+              <a:rPr lang="it-IT" sz="4000" dirty="0"/>
               <a:t>🧑🏼‍🧑🏿‍🧒🏽‍🧒</a:t>
             </a:r>
           </a:p>
           <a:p>
             <a:pPr algn="ctr"/>
             <a:r>
-              <a:rPr lang="en-GB" b="1"/>
+              <a:rPr lang="en-GB" b="1" dirty="0"/>
               <a:t>Long-Term Societal Effects</a:t>
             </a:r>
           </a:p>
           <a:p>
             <a:pPr algn="ctr"/>
-            <a:endParaRPr lang="en-GB"/>
-          </a:p>
-          <a:p>
-            <a:r>
-              <a:rPr lang="it-IT" sz="1600"/>
+            <a:endParaRPr lang="en-GB" dirty="0"/>
+          </a:p>
+          <a:p>
+            <a:r>
+              <a:rPr lang="it-IT" sz="1600" dirty="0"/>
               <a:t>⚠️</a:t>
             </a:r>
             <a:r>
-              <a:rPr lang="en-GB" sz="1600"/>
+              <a:rPr lang="en-GB" sz="1600" dirty="0"/>
               <a:t>Widespread use of systems may have lasting effects on </a:t>
             </a:r>
             <a:r>
-              <a:rPr lang="it-IT" sz="1600"/>
+              <a:rPr lang="it-IT" sz="1600" dirty="0"/>
               <a:t>society</a:t>
             </a:r>
           </a:p>
           <a:p>
-            <a:endParaRPr lang="it-IT" sz="1600"/>
-          </a:p>
-          <a:p>
-            <a:r>
-              <a:rPr lang="it-IT" sz="1600"/>
+            <a:endParaRPr lang="it-IT" sz="1600" dirty="0"/>
+          </a:p>
+          <a:p>
+            <a:r>
+              <a:rPr lang="it-IT" sz="1600" dirty="0"/>
               <a:t>🧑🏽‍🏫 </a:t>
             </a:r>
             <a:r>
-              <a:rPr lang="en-GB" sz="1600"/>
-              <a:t>People altering their online behaviour to conform to norms</a:t>
-            </a:r>
-          </a:p>
-          <a:p>
-            <a:r>
-              <a:rPr lang="en-GB" sz="1600"/>
+              <a:rPr lang="en-GB" sz="1600" dirty="0"/>
+              <a:t>People </a:t>
+            </a:r>
+            <a:r>
+              <a:rPr lang="en-GB" sz="1600" u="sng" dirty="0"/>
+              <a:t>altering their online behaviour</a:t>
+            </a:r>
+            <a:r>
+              <a:rPr lang="en-GB" sz="1600" dirty="0"/>
+              <a:t> to conform to norms</a:t>
+            </a:r>
+          </a:p>
+          <a:p>
+            <a:r>
+              <a:rPr lang="en-GB" sz="1600" dirty="0"/>
               <a:t>🔴 Homogenization of individual expression</a:t>
             </a:r>
           </a:p>
           <a:p>
             <a:r>
-              <a:rPr lang="en-GB" sz="1600"/>
+              <a:rPr lang="en-GB" sz="1600" dirty="0"/>
               <a:t>🟢 Public discourse, ethical use, regulations</a:t>
             </a:r>
           </a:p>
@@ -29318,7 +29436,7 @@
           <a:effectLst/>
           <a:extLst>
             <a:ext uri="{91240B29-F687-4f45-9708-019B960494DF}">
-              <a14:hiddenLine xmlns="" xmlns:p14="http://schemas.microsoft.com/office/powerpoint/2010/main" xmlns:a16="http://schemas.microsoft.com/office/drawing/2014/main" xmlns:a14="http://schemas.microsoft.com/office/drawing/2010/main" w="9525">
+              <a14:hiddenLine xmlns:a14="http://schemas.microsoft.com/office/drawing/2010/main" xmlns:a16="http://schemas.microsoft.com/office/drawing/2014/main" xmlns:p14="http://schemas.microsoft.com/office/powerpoint/2010/main" xmlns="" w="9525">
                 <a:solidFill>
                   <a:srgbClr val="000000"/>
                 </a:solidFill>
@@ -33349,6 +33467,15 @@
 </file>
 
 <file path=customXml/item1.xml><?xml version="1.0" encoding="utf-8"?>
+<?mso-contentType ?>
+<FormTemplates xmlns="http://schemas.microsoft.com/sharepoint/v3/contenttype/forms">
+  <Display>DocumentLibraryForm</Display>
+  <Edit>DocumentLibraryForm</Edit>
+  <New>DocumentLibraryForm</New>
+</FormTemplates>
+</file>
+
+<file path=customXml/item2.xml><?xml version="1.0" encoding="utf-8"?>
 <p:properties xmlns:p="http://schemas.microsoft.com/office/2006/metadata/properties" xmlns:xsi="http://www.w3.org/2001/XMLSchema-instance" xmlns:pc="http://schemas.microsoft.com/office/infopath/2007/PartnerControls">
   <documentManagement>
     <MediaServiceKeyPoints xmlns="71af3243-3dd4-4a8d-8c0d-dd76da1f02a5" xsi:nil="true"/>
@@ -33356,7 +33483,7 @@
 </p:properties>
 </file>
 
-<file path=customXml/item2.xml><?xml version="1.0" encoding="utf-8"?>
+<file path=customXml/item3.xml><?xml version="1.0" encoding="utf-8"?>
 <ct:contentTypeSchema xmlns:ct="http://schemas.microsoft.com/office/2006/metadata/contentType" xmlns:ma="http://schemas.microsoft.com/office/2006/metadata/properties/metaAttributes" ct:_="" ma:_="" ma:contentTypeName="Document" ma:contentTypeID="0x01010079F111ED35F8CC479449609E8A0923A6" ma:contentTypeVersion="11" ma:contentTypeDescription="Create a new document." ma:contentTypeScope="" ma:versionID="9677210f24a1be23c92c90fd886aa0aa">
   <xsd:schema xmlns:xsd="http://www.w3.org/2001/XMLSchema" xmlns:xs="http://www.w3.org/2001/XMLSchema" xmlns:p="http://schemas.microsoft.com/office/2006/metadata/properties" xmlns:ns2="71af3243-3dd4-4a8d-8c0d-dd76da1f02a5" xmlns:ns3="16c05727-aa75-4e4a-9b5f-8a80a1165891" targetNamespace="http://schemas.microsoft.com/office/2006/metadata/properties" ma:root="true" ma:fieldsID="60e05723c5c1908df1a1a4ebf11d344e" ns2:_="" ns3:_="">
     <xsd:import namespace="71af3243-3dd4-4a8d-8c0d-dd76da1f02a5"/>
@@ -33567,16 +33694,15 @@
 </ct:contentTypeSchema>
 </file>
 
-<file path=customXml/item3.xml><?xml version="1.0" encoding="utf-8"?>
-<?mso-contentType ?>
-<FormTemplates xmlns="http://schemas.microsoft.com/sharepoint/v3/contenttype/forms">
-  <Display>DocumentLibraryForm</Display>
-  <Edit>DocumentLibraryForm</Edit>
-  <New>DocumentLibraryForm</New>
-</FormTemplates>
+<file path=customXml/itemProps1.xml><?xml version="1.0" encoding="utf-8"?>
+<ds:datastoreItem xmlns:ds="http://schemas.openxmlformats.org/officeDocument/2006/customXml" ds:itemID="{A2F4A21B-80B9-40F1-8308-E0B7F0FE0B09}">
+  <ds:schemaRefs>
+    <ds:schemaRef ds:uri="http://schemas.microsoft.com/sharepoint/v3/contenttype/forms"/>
+  </ds:schemaRefs>
+</ds:datastoreItem>
 </file>
 
-<file path=customXml/itemProps1.xml><?xml version="1.0" encoding="utf-8"?>
+<file path=customXml/itemProps2.xml><?xml version="1.0" encoding="utf-8"?>
 <ds:datastoreItem xmlns:ds="http://schemas.openxmlformats.org/officeDocument/2006/customXml" ds:itemID="{F3E96646-423E-4354-94C2-1A28227BF075}">
   <ds:schemaRefs>
     <ds:schemaRef ds:uri="71af3243-3dd4-4a8d-8c0d-dd76da1f02a5"/>
@@ -33586,7 +33712,7 @@
 </ds:datastoreItem>
 </file>
 
-<file path=customXml/itemProps2.xml><?xml version="1.0" encoding="utf-8"?>
+<file path=customXml/itemProps3.xml><?xml version="1.0" encoding="utf-8"?>
 <ds:datastoreItem xmlns:ds="http://schemas.openxmlformats.org/officeDocument/2006/customXml" ds:itemID="{0F051B7F-F45F-4FBB-974B-85B568B21B4D}">
   <ds:schemaRefs>
     <ds:schemaRef ds:uri="16c05727-aa75-4e4a-9b5f-8a80a1165891"/>
@@ -33603,12 +33729,4 @@
     <ds:schemaRef ds:uri="http://www.w3.org/2001/XMLSchema"/>
   </ds:schemaRefs>
 </ds:datastoreItem>
-</file>
-
-<file path=customXml/itemProps3.xml><?xml version="1.0" encoding="utf-8"?>
-<ds:datastoreItem xmlns:ds="http://schemas.openxmlformats.org/officeDocument/2006/customXml" ds:itemID="{A2F4A21B-80B9-40F1-8308-E0B7F0FE0B09}">
-  <ds:schemaRefs>
-    <ds:schemaRef ds:uri="http://schemas.microsoft.com/sharepoint/v3/contenttype/forms"/>
-  </ds:schemaRefs>
-</ds:datastoreItem>
 </file>
</xml_diff>